<commit_message>
add room for presentations
</commit_message>
<xml_diff>
--- a/14 - Presentations and Wrap-Up/causal inference.pptx
+++ b/14 - Presentations and Wrap-Up/causal inference.pptx
@@ -6,7 +6,7 @@
     <p:sldMasterId id="2147483656" r:id="rId2"/>
   </p:sldMasterIdLst>
   <p:notesMasterIdLst>
-    <p:notesMasterId r:id="rId50"/>
+    <p:notesMasterId r:id="rId51"/>
   </p:notesMasterIdLst>
   <p:sldIdLst>
     <p:sldId id="256" r:id="rId3"/>
@@ -56,6 +56,7 @@
     <p:sldId id="276" r:id="rId47"/>
     <p:sldId id="277" r:id="rId48"/>
     <p:sldId id="278" r:id="rId49"/>
+    <p:sldId id="628" r:id="rId50"/>
   </p:sldIdLst>
   <p:sldSz cx="12192000" cy="6858000"/>
   <p:notesSz cx="6858000" cy="9144000"/>
@@ -293,7 +294,7 @@
       <p15:sldGuideLst xmlns:p15="http://schemas.microsoft.com/office/powerpoint/2012/main"/>
     </p:ext>
     <p:ext uri="http://customooxmlschemas.google.com/">
-      <go:slidesCustomData xmlns="" xmlns:mc="http://schemas.openxmlformats.org/markup-compatibility/2006" xmlns:mv="urn:schemas-microsoft-com:mac:vml" xmlns:c="http://schemas.openxmlformats.org/drawingml/2006/chart" xmlns:dgm="http://schemas.openxmlformats.org/drawingml/2006/diagram" xmlns:o="urn:schemas-microsoft-com:office:office" xmlns:v="urn:schemas-microsoft-com:vml" xmlns:pvml="urn:schemas-microsoft-com:office:powerpoint" xmlns:com="http://schemas.openxmlformats.org/drawingml/2006/compatibility" xmlns:p14="http://schemas.microsoft.com/office/powerpoint/2010/main" xmlns:p15="http://schemas.microsoft.com/office/powerpoint/2012/main" xmlns:go="http://customooxmlschemas.google.com/" r:id="rId51" roundtripDataSignature="AMtx7mgWqGpmJnm2LhSO/E7EgiMMs26KqA=="/>
+      <go:slidesCustomData xmlns:go="http://customooxmlschemas.google.com/" xmlns:p15="http://schemas.microsoft.com/office/powerpoint/2012/main" xmlns:p14="http://schemas.microsoft.com/office/powerpoint/2010/main" xmlns:com="http://schemas.openxmlformats.org/drawingml/2006/compatibility" xmlns:pvml="urn:schemas-microsoft-com:office:powerpoint" xmlns:v="urn:schemas-microsoft-com:vml" xmlns:o="urn:schemas-microsoft-com:office:office" xmlns:dgm="http://schemas.openxmlformats.org/drawingml/2006/diagram" xmlns:c="http://schemas.openxmlformats.org/drawingml/2006/chart" xmlns:mv="urn:schemas-microsoft-com:mac:vml" xmlns:mc="http://schemas.openxmlformats.org/markup-compatibility/2006" xmlns="" r:id="rId52" roundtripDataSignature="AMtx7mgWqGpmJnm2LhSO/E7EgiMMs26KqA=="/>
     </p:ext>
   </p:extLst>
 </p:presentation>
@@ -34667,7 +34668,15 @@
           <a:p>
             <a:r>
               <a:rPr lang="en-US" dirty="0"/>
-              <a:t>Project Presentations on Wednesday</a:t>
+              <a:t>Project Presentations on Wednesday </a:t>
+            </a:r>
+            <a:r>
+              <a:rPr lang="en-US" b="1" dirty="0">
+                <a:solidFill>
+                  <a:srgbClr val="941100"/>
+                </a:solidFill>
+              </a:rPr>
+              <a:t>(HBH 1202)</a:t>
             </a:r>
           </a:p>
           <a:p>
@@ -44388,7 +44397,7 @@
               <a:solidFill>
                 <a:srgbClr val="C00000"/>
               </a:solidFill>
-              <a:hlinkClick r:id="">
+              <a:hlinkClick r:id="" action="ppaction://noaction">
                 <a:extLst>
                   <a:ext uri="{A12FA001-AC4F-418D-AE19-62706E023703}">
                     <ahyp:hlinkClr xmlns:ahyp="http://schemas.microsoft.com/office/drawing/2018/hyperlinkcolor" val="tx"/>
@@ -44405,7 +44414,7 @@
               <a:solidFill>
                 <a:srgbClr val="C00000"/>
               </a:solidFill>
-              <a:hlinkClick r:id="">
+              <a:hlinkClick r:id="" action="ppaction://noaction">
                 <a:extLst>
                   <a:ext uri="{A12FA001-AC4F-418D-AE19-62706E023703}">
                     <ahyp:hlinkClr xmlns:ahyp="http://schemas.microsoft.com/office/drawing/2018/hyperlinkcolor" val="tx"/>
@@ -44422,7 +44431,7 @@
               <a:solidFill>
                 <a:srgbClr val="C00000"/>
               </a:solidFill>
-              <a:hlinkClick r:id="">
+              <a:hlinkClick r:id="" action="ppaction://noaction">
                 <a:extLst>
                   <a:ext uri="{A12FA001-AC4F-418D-AE19-62706E023703}">
                     <ahyp:hlinkClr xmlns:ahyp="http://schemas.microsoft.com/office/drawing/2018/hyperlinkcolor" val="tx"/>
@@ -46915,6 +46924,144 @@
         </p:txBody>
       </p:sp>
     </p:spTree>
+  </p:cSld>
+  <p:clrMapOvr>
+    <a:masterClrMapping/>
+  </p:clrMapOvr>
+</p:sld>
+</file>
+
+<file path=ppt/slides/slide48.xml><?xml version="1.0" encoding="utf-8"?>
+<p:sld xmlns:a="http://schemas.openxmlformats.org/drawingml/2006/main" xmlns:r="http://schemas.openxmlformats.org/officeDocument/2006/relationships" xmlns:p="http://schemas.openxmlformats.org/presentationml/2006/main">
+  <p:cSld>
+    <p:spTree>
+      <p:nvGrpSpPr>
+        <p:cNvPr id="1" name=""/>
+        <p:cNvGrpSpPr/>
+        <p:nvPr/>
+      </p:nvGrpSpPr>
+      <p:grpSpPr>
+        <a:xfrm>
+          <a:off x="0" y="0"/>
+          <a:ext cx="0" cy="0"/>
+          <a:chOff x="0" y="0"/>
+          <a:chExt cx="0" cy="0"/>
+        </a:xfrm>
+      </p:grpSpPr>
+      <p:sp>
+        <p:nvSpPr>
+          <p:cNvPr id="3" name="Title 2">
+            <a:extLst>
+              <a:ext uri="{FF2B5EF4-FFF2-40B4-BE49-F238E27FC236}">
+                <a16:creationId xmlns:a16="http://schemas.microsoft.com/office/drawing/2014/main" id="{9323871C-7CA8-1448-8FFC-1AE6E1838941}"/>
+              </a:ext>
+            </a:extLst>
+          </p:cNvPr>
+          <p:cNvSpPr>
+            <a:spLocks noGrp="1"/>
+          </p:cNvSpPr>
+          <p:nvPr>
+            <p:ph type="title"/>
+          </p:nvPr>
+        </p:nvSpPr>
+        <p:spPr/>
+        <p:txBody>
+          <a:bodyPr/>
+          <a:lstStyle/>
+          <a:p>
+            <a:r>
+              <a:rPr lang="en-US" dirty="0"/>
+              <a:t>Reminders</a:t>
+            </a:r>
+          </a:p>
+        </p:txBody>
+      </p:sp>
+      <p:sp>
+        <p:nvSpPr>
+          <p:cNvPr id="5" name="Text Placeholder 4">
+            <a:extLst>
+              <a:ext uri="{FF2B5EF4-FFF2-40B4-BE49-F238E27FC236}">
+                <a16:creationId xmlns:a16="http://schemas.microsoft.com/office/drawing/2014/main" id="{F4E0A5F0-1D89-954D-91FB-596CD9E690F2}"/>
+              </a:ext>
+            </a:extLst>
+          </p:cNvPr>
+          <p:cNvSpPr>
+            <a:spLocks noGrp="1"/>
+          </p:cNvSpPr>
+          <p:nvPr>
+            <p:ph type="body" idx="1"/>
+          </p:nvPr>
+        </p:nvSpPr>
+        <p:spPr/>
+        <p:txBody>
+          <a:bodyPr/>
+          <a:lstStyle/>
+          <a:p>
+            <a:pPr marL="76200" indent="0">
+              <a:buNone/>
+            </a:pPr>
+            <a:r>
+              <a:rPr lang="en-US" b="1" dirty="0"/>
+              <a:t>This week:</a:t>
+            </a:r>
+            <a:endParaRPr lang="en-US" dirty="0"/>
+          </a:p>
+          <a:p>
+            <a:r>
+              <a:rPr lang="en-US" dirty="0"/>
+              <a:t>Project Presentations on Wednesday </a:t>
+            </a:r>
+            <a:r>
+              <a:rPr lang="en-US" b="1" dirty="0">
+                <a:solidFill>
+                  <a:srgbClr val="941100"/>
+                </a:solidFill>
+              </a:rPr>
+              <a:t>(HBH 1202)</a:t>
+            </a:r>
+          </a:p>
+          <a:p>
+            <a:r>
+              <a:rPr lang="en-US" dirty="0"/>
+              <a:t>No class on Thursday</a:t>
+            </a:r>
+          </a:p>
+          <a:p>
+            <a:pPr marL="76200" indent="0">
+              <a:buNone/>
+            </a:pPr>
+            <a:endParaRPr lang="en-US" dirty="0"/>
+          </a:p>
+          <a:p>
+            <a:pPr marL="76200" indent="0">
+              <a:buNone/>
+            </a:pPr>
+            <a:r>
+              <a:rPr lang="en-US" b="1" dirty="0"/>
+              <a:t>Coming up next week:</a:t>
+            </a:r>
+          </a:p>
+          <a:p>
+            <a:r>
+              <a:rPr lang="en-US" dirty="0">
+                <a:solidFill>
+                  <a:srgbClr val="C00000"/>
+                </a:solidFill>
+              </a:rPr>
+              <a:t>Final Reports due on Thursday</a:t>
+            </a:r>
+          </a:p>
+          <a:p>
+            <a:endParaRPr lang="en-US" dirty="0"/>
+          </a:p>
+        </p:txBody>
+      </p:sp>
+    </p:spTree>
+    <p:extLst>
+      <p:ext uri="{BB962C8B-B14F-4D97-AF65-F5344CB8AC3E}">
+        <p14:creationId xmlns:p14="http://schemas.microsoft.com/office/powerpoint/2010/main" val="1241616482"/>
+      </p:ext>
+    </p:extLst>
   </p:cSld>
   <p:clrMapOvr>
     <a:masterClrMapping/>

</xml_diff>